<commit_message>
vault backup: 2022-12-20 07:31:50
Affected files:
Университет/Учебные программы/ПИРСБД/Граф дисциплин.pptx
</commit_message>
<xml_diff>
--- a/Университет/Учебные программы/ПИРСБД/Граф дисциплин.pptx
+++ b/Университет/Учебные программы/ПИРСБД/Граф дисциплин.pptx
@@ -104,6 +104,11 @@
       </a:defRPr>
     </a:lvl9pPr>
   </p:defaultTextStyle>
+  <p:extLst>
+    <p:ext uri="{EFAFB233-063F-42B5-8137-9DF3F51BA10A}">
+      <p15:sldGuideLst xmlns:p15="http://schemas.microsoft.com/office/powerpoint/2012/main"/>
+    </p:ext>
+  </p:extLst>
 </p:presentation>
 </file>
 
@@ -254,7 +259,7 @@
           <a:p>
             <a:fld id="{DEE761D8-1087-457D-8738-A6FF75F9B1E4}" type="datetimeFigureOut">
               <a:rPr lang="ru-RU" smtClean="0"/>
-              <a:t>17.12.2022</a:t>
+              <a:t>19.12.2022</a:t>
             </a:fld>
             <a:endParaRPr lang="ru-RU"/>
           </a:p>
@@ -452,7 +457,7 @@
           <a:p>
             <a:fld id="{DEE761D8-1087-457D-8738-A6FF75F9B1E4}" type="datetimeFigureOut">
               <a:rPr lang="ru-RU" smtClean="0"/>
-              <a:t>17.12.2022</a:t>
+              <a:t>19.12.2022</a:t>
             </a:fld>
             <a:endParaRPr lang="ru-RU"/>
           </a:p>
@@ -660,7 +665,7 @@
           <a:p>
             <a:fld id="{DEE761D8-1087-457D-8738-A6FF75F9B1E4}" type="datetimeFigureOut">
               <a:rPr lang="ru-RU" smtClean="0"/>
-              <a:t>17.12.2022</a:t>
+              <a:t>19.12.2022</a:t>
             </a:fld>
             <a:endParaRPr lang="ru-RU"/>
           </a:p>
@@ -858,7 +863,7 @@
           <a:p>
             <a:fld id="{DEE761D8-1087-457D-8738-A6FF75F9B1E4}" type="datetimeFigureOut">
               <a:rPr lang="ru-RU" smtClean="0"/>
-              <a:t>17.12.2022</a:t>
+              <a:t>19.12.2022</a:t>
             </a:fld>
             <a:endParaRPr lang="ru-RU"/>
           </a:p>
@@ -1133,7 +1138,7 @@
           <a:p>
             <a:fld id="{DEE761D8-1087-457D-8738-A6FF75F9B1E4}" type="datetimeFigureOut">
               <a:rPr lang="ru-RU" smtClean="0"/>
-              <a:t>17.12.2022</a:t>
+              <a:t>19.12.2022</a:t>
             </a:fld>
             <a:endParaRPr lang="ru-RU"/>
           </a:p>
@@ -1398,7 +1403,7 @@
           <a:p>
             <a:fld id="{DEE761D8-1087-457D-8738-A6FF75F9B1E4}" type="datetimeFigureOut">
               <a:rPr lang="ru-RU" smtClean="0"/>
-              <a:t>17.12.2022</a:t>
+              <a:t>19.12.2022</a:t>
             </a:fld>
             <a:endParaRPr lang="ru-RU"/>
           </a:p>
@@ -1810,7 +1815,7 @@
           <a:p>
             <a:fld id="{DEE761D8-1087-457D-8738-A6FF75F9B1E4}" type="datetimeFigureOut">
               <a:rPr lang="ru-RU" smtClean="0"/>
-              <a:t>17.12.2022</a:t>
+              <a:t>19.12.2022</a:t>
             </a:fld>
             <a:endParaRPr lang="ru-RU"/>
           </a:p>
@@ -1951,7 +1956,7 @@
           <a:p>
             <a:fld id="{DEE761D8-1087-457D-8738-A6FF75F9B1E4}" type="datetimeFigureOut">
               <a:rPr lang="ru-RU" smtClean="0"/>
-              <a:t>17.12.2022</a:t>
+              <a:t>19.12.2022</a:t>
             </a:fld>
             <a:endParaRPr lang="ru-RU"/>
           </a:p>
@@ -2064,7 +2069,7 @@
           <a:p>
             <a:fld id="{DEE761D8-1087-457D-8738-A6FF75F9B1E4}" type="datetimeFigureOut">
               <a:rPr lang="ru-RU" smtClean="0"/>
-              <a:t>17.12.2022</a:t>
+              <a:t>19.12.2022</a:t>
             </a:fld>
             <a:endParaRPr lang="ru-RU"/>
           </a:p>
@@ -2375,7 +2380,7 @@
           <a:p>
             <a:fld id="{DEE761D8-1087-457D-8738-A6FF75F9B1E4}" type="datetimeFigureOut">
               <a:rPr lang="ru-RU" smtClean="0"/>
-              <a:t>17.12.2022</a:t>
+              <a:t>19.12.2022</a:t>
             </a:fld>
             <a:endParaRPr lang="ru-RU"/>
           </a:p>
@@ -2663,7 +2668,7 @@
           <a:p>
             <a:fld id="{DEE761D8-1087-457D-8738-A6FF75F9B1E4}" type="datetimeFigureOut">
               <a:rPr lang="ru-RU" smtClean="0"/>
-              <a:t>17.12.2022</a:t>
+              <a:t>19.12.2022</a:t>
             </a:fld>
             <a:endParaRPr lang="ru-RU"/>
           </a:p>
@@ -2904,7 +2909,7 @@
           <a:p>
             <a:fld id="{DEE761D8-1087-457D-8738-A6FF75F9B1E4}" type="datetimeFigureOut">
               <a:rPr lang="ru-RU" smtClean="0"/>
-              <a:t>17.12.2022</a:t>
+              <a:t>19.12.2022</a:t>
             </a:fld>
             <a:endParaRPr lang="ru-RU"/>
           </a:p>
@@ -3336,7 +3341,7 @@
         <p:spPr>
           <a:xfrm>
             <a:off x="8506501" y="3974358"/>
-            <a:ext cx="3240022" cy="2633941"/>
+            <a:ext cx="3240022" cy="2749530"/>
           </a:xfrm>
           <a:prstGeom prst="rect">
             <a:avLst/>
@@ -3382,7 +3387,7 @@
         <p:spPr>
           <a:xfrm>
             <a:off x="167054" y="3692769"/>
-            <a:ext cx="3208623" cy="2768821"/>
+            <a:ext cx="3208623" cy="3031119"/>
           </a:xfrm>
           <a:prstGeom prst="rect">
             <a:avLst/>
@@ -3427,8 +3432,8 @@
         </p:nvSpPr>
         <p:spPr>
           <a:xfrm>
-            <a:off x="2716823" y="516584"/>
-            <a:ext cx="7367954" cy="4566073"/>
+            <a:off x="2716823" y="904626"/>
+            <a:ext cx="7367954" cy="4178031"/>
           </a:xfrm>
           <a:prstGeom prst="rect">
             <a:avLst/>
@@ -3473,8 +3478,8 @@
         </p:nvSpPr>
         <p:spPr>
           <a:xfrm>
-            <a:off x="5101234" y="792792"/>
-            <a:ext cx="2393361" cy="738664"/>
+            <a:off x="5101234" y="954699"/>
+            <a:ext cx="2393361" cy="646331"/>
           </a:xfrm>
           <a:prstGeom prst="rect">
             <a:avLst/>
@@ -3505,7 +3510,7 @@
           <a:lstStyle/>
           <a:p>
             <a:r>
-              <a:rPr lang="ru-RU" sz="1400" dirty="0"/>
+              <a:rPr lang="ru-RU" sz="1200" dirty="0"/>
               <a:t>Фундаментальные основы систем обработки больших данных</a:t>
             </a:r>
           </a:p>
@@ -3526,7 +3531,7 @@
         <p:spPr>
           <a:xfrm>
             <a:off x="7610126" y="2032337"/>
-            <a:ext cx="2393361" cy="523220"/>
+            <a:ext cx="2393361" cy="461665"/>
           </a:xfrm>
           <a:prstGeom prst="rect">
             <a:avLst/>
@@ -3557,7 +3562,7 @@
           <a:lstStyle/>
           <a:p>
             <a:r>
-              <a:rPr lang="ru-RU" sz="1400" dirty="0"/>
+              <a:rPr lang="ru-RU" sz="1200" dirty="0"/>
               <a:t>Хранение и алгоритмы сжатия данных</a:t>
             </a:r>
           </a:p>
@@ -3578,7 +3583,7 @@
         <p:spPr>
           <a:xfrm>
             <a:off x="5101234" y="2032337"/>
-            <a:ext cx="2393361" cy="523220"/>
+            <a:ext cx="2393361" cy="461665"/>
           </a:xfrm>
           <a:prstGeom prst="rect">
             <a:avLst/>
@@ -3609,7 +3614,7 @@
           <a:lstStyle/>
           <a:p>
             <a:r>
-              <a:rPr lang="ru-RU" sz="1400" dirty="0"/>
+              <a:rPr lang="ru-RU" sz="1200" dirty="0"/>
               <a:t>Структуры и алгоритмы индексации данных</a:t>
             </a:r>
           </a:p>
@@ -3630,7 +3635,7 @@
         <p:spPr>
           <a:xfrm>
             <a:off x="7610126" y="3429000"/>
-            <a:ext cx="2138728" cy="523220"/>
+            <a:ext cx="2138728" cy="461665"/>
           </a:xfrm>
           <a:prstGeom prst="rect">
             <a:avLst/>
@@ -3661,7 +3666,7 @@
           <a:lstStyle/>
           <a:p>
             <a:r>
-              <a:rPr lang="ru-RU" sz="1400" dirty="0"/>
+              <a:rPr lang="ru-RU" sz="1200" dirty="0"/>
               <a:t>Надежность систем хранения данных</a:t>
             </a:r>
           </a:p>
@@ -3682,7 +3687,7 @@
         <p:spPr>
           <a:xfrm>
             <a:off x="3084366" y="3429000"/>
-            <a:ext cx="1901337" cy="523220"/>
+            <a:ext cx="1901337" cy="461665"/>
           </a:xfrm>
           <a:prstGeom prst="rect">
             <a:avLst/>
@@ -3713,10 +3718,9 @@
           <a:lstStyle/>
           <a:p>
             <a:r>
-              <a:rPr lang="ru-RU" sz="1400"/>
-              <a:t>Распределенные системы</a:t>
-            </a:r>
-            <a:endParaRPr lang="ru-RU" sz="1400" dirty="0"/>
+              <a:rPr lang="ru-RU" sz="1200" dirty="0"/>
+              <a:t>Архитектура распределенных систем</a:t>
+            </a:r>
           </a:p>
         </p:txBody>
       </p:sp>
@@ -3734,8 +3738,8 @@
         </p:nvSpPr>
         <p:spPr>
           <a:xfrm>
-            <a:off x="5286009" y="3429552"/>
-            <a:ext cx="2024429" cy="523220"/>
+            <a:off x="5304041" y="3254736"/>
+            <a:ext cx="2024429" cy="276999"/>
           </a:xfrm>
           <a:prstGeom prst="rect">
             <a:avLst/>
@@ -3766,11 +3770,11 @@
           <a:lstStyle/>
           <a:p>
             <a:r>
-              <a:rPr lang="ru-RU" sz="1400" dirty="0" err="1"/>
+              <a:rPr lang="ru-RU" sz="1200" dirty="0" err="1"/>
               <a:t>NoSQL</a:t>
             </a:r>
             <a:r>
-              <a:rPr lang="ru-RU" sz="1400" dirty="0"/>
+              <a:rPr lang="ru-RU" sz="1200" dirty="0"/>
               <a:t> хранилища данных</a:t>
             </a:r>
           </a:p>
@@ -3791,7 +3795,7 @@
         <p:spPr>
           <a:xfrm>
             <a:off x="2816480" y="2021935"/>
-            <a:ext cx="2169223" cy="954107"/>
+            <a:ext cx="2169223" cy="646331"/>
           </a:xfrm>
           <a:prstGeom prst="rect">
             <a:avLst/>
@@ -3822,7 +3826,7 @@
           <a:lstStyle/>
           <a:p>
             <a:r>
-              <a:rPr lang="ru-RU" sz="1400" dirty="0"/>
+              <a:rPr lang="ru-RU" sz="1200" dirty="0"/>
               <a:t>Параллельная и распределенная обработка больших данных</a:t>
             </a:r>
           </a:p>
@@ -3842,8 +3846,8 @@
         </p:nvSpPr>
         <p:spPr>
           <a:xfrm>
-            <a:off x="3385849" y="792792"/>
-            <a:ext cx="1599854" cy="738664"/>
+            <a:off x="3406169" y="944279"/>
+            <a:ext cx="1599854" cy="646331"/>
           </a:xfrm>
           <a:prstGeom prst="rect">
             <a:avLst/>
@@ -3874,7 +3878,7 @@
           <a:lstStyle/>
           <a:p>
             <a:r>
-              <a:rPr lang="ru-RU" sz="1400" dirty="0"/>
+              <a:rPr lang="ru-RU" sz="1200" dirty="0"/>
               <a:t>Методология программной инженерии</a:t>
             </a:r>
           </a:p>
@@ -3894,8 +3898,8 @@
         </p:nvSpPr>
         <p:spPr>
           <a:xfrm>
-            <a:off x="5101234" y="4488719"/>
-            <a:ext cx="2393361" cy="523220"/>
+            <a:off x="5101234" y="4238376"/>
+            <a:ext cx="2393361" cy="461665"/>
           </a:xfrm>
           <a:prstGeom prst="rect">
             <a:avLst/>
@@ -3926,7 +3930,7 @@
           <a:lstStyle/>
           <a:p>
             <a:r>
-              <a:rPr lang="ru-RU" sz="1400" dirty="0"/>
+              <a:rPr lang="ru-RU" sz="1200" dirty="0"/>
               <a:t>Архитектура систем обработки больших данных</a:t>
             </a:r>
           </a:p>
@@ -3946,8 +3950,8 @@
         </p:nvSpPr>
         <p:spPr>
           <a:xfrm>
-            <a:off x="929182" y="5818196"/>
-            <a:ext cx="2220057" cy="523220"/>
+            <a:off x="904043" y="6136070"/>
+            <a:ext cx="2220057" cy="276999"/>
           </a:xfrm>
           <a:prstGeom prst="rect">
             <a:avLst/>
@@ -3982,7 +3986,7 @@
           <a:lstStyle/>
           <a:p>
             <a:r>
-              <a:rPr lang="ru-RU" sz="1400" dirty="0"/>
+              <a:rPr lang="ru-RU" sz="1200" dirty="0"/>
               <a:t>Основы машинного обучения</a:t>
             </a:r>
           </a:p>
@@ -4002,8 +4006,8 @@
         </p:nvSpPr>
         <p:spPr>
           <a:xfrm>
-            <a:off x="929183" y="5025361"/>
-            <a:ext cx="2220057" cy="523220"/>
+            <a:off x="900869" y="5192481"/>
+            <a:ext cx="2220057" cy="461665"/>
           </a:xfrm>
           <a:prstGeom prst="rect">
             <a:avLst/>
@@ -4038,7 +4042,7 @@
           <a:lstStyle/>
           <a:p>
             <a:r>
-              <a:rPr lang="ru-RU" sz="1400" dirty="0"/>
+              <a:rPr lang="ru-RU" sz="1200" dirty="0"/>
               <a:t>Распределенное машинное обучение</a:t>
             </a:r>
           </a:p>
@@ -4114,8 +4118,8 @@
         </p:nvSpPr>
         <p:spPr>
           <a:xfrm>
-            <a:off x="521202" y="4432126"/>
-            <a:ext cx="2628038" cy="307777"/>
+            <a:off x="508984" y="4340005"/>
+            <a:ext cx="2628038" cy="276999"/>
           </a:xfrm>
           <a:prstGeom prst="rect">
             <a:avLst/>
@@ -4150,7 +4154,7 @@
           <a:lstStyle/>
           <a:p>
             <a:r>
-              <a:rPr lang="ru-RU" sz="1400" dirty="0"/>
+              <a:rPr lang="ru-RU" sz="1200" dirty="0"/>
               <a:t>Аппаратные вычислители</a:t>
             </a:r>
           </a:p>
@@ -4170,8 +4174,8 @@
         </p:nvSpPr>
         <p:spPr>
           <a:xfrm>
-            <a:off x="8679489" y="5938370"/>
-            <a:ext cx="2628038" cy="523220"/>
+            <a:off x="8679489" y="6234482"/>
+            <a:ext cx="2628038" cy="461665"/>
           </a:xfrm>
           <a:prstGeom prst="rect">
             <a:avLst/>
@@ -4209,7 +4213,7 @@
           <a:lstStyle/>
           <a:p>
             <a:r>
-              <a:rPr lang="ru-RU" sz="1400" dirty="0"/>
+              <a:rPr lang="ru-RU" sz="1200" dirty="0"/>
               <a:t>Системы потоковой обработки данных</a:t>
             </a:r>
           </a:p>
@@ -4230,7 +4234,7 @@
         <p:spPr>
           <a:xfrm>
             <a:off x="8679490" y="4671774"/>
-            <a:ext cx="2628038" cy="307777"/>
+            <a:ext cx="2628038" cy="276999"/>
           </a:xfrm>
           <a:prstGeom prst="rect">
             <a:avLst/>
@@ -4268,7 +4272,7 @@
           <a:lstStyle/>
           <a:p>
             <a:r>
-              <a:rPr lang="ru-RU" sz="1400" dirty="0"/>
+              <a:rPr lang="ru-RU" sz="1200" dirty="0"/>
               <a:t>Аналитика больших данных</a:t>
             </a:r>
           </a:p>
@@ -4348,8 +4352,8 @@
         </p:nvSpPr>
         <p:spPr>
           <a:xfrm>
-            <a:off x="8679490" y="5202831"/>
-            <a:ext cx="2628038" cy="523220"/>
+            <a:off x="8679490" y="5328499"/>
+            <a:ext cx="2628038" cy="461665"/>
           </a:xfrm>
           <a:prstGeom prst="rect">
             <a:avLst/>
@@ -4387,7 +4391,7 @@
           <a:lstStyle/>
           <a:p>
             <a:r>
-              <a:rPr lang="ru-RU" sz="1400" dirty="0"/>
+              <a:rPr lang="ru-RU" sz="1200" dirty="0"/>
               <a:t>Java для высоконагруженных вычислений</a:t>
             </a:r>
           </a:p>
@@ -4410,8 +4414,8 @@
         </p:nvCxnSpPr>
         <p:spPr>
           <a:xfrm flipH="1">
-            <a:off x="3901092" y="1531456"/>
-            <a:ext cx="2396823" cy="490479"/>
+            <a:off x="3901092" y="1601030"/>
+            <a:ext cx="2396823" cy="420905"/>
           </a:xfrm>
           <a:prstGeom prst="straightConnector1">
             <a:avLst/>
@@ -4452,8 +4456,8 @@
         </p:nvCxnSpPr>
         <p:spPr>
           <a:xfrm>
-            <a:off x="6297915" y="1531456"/>
-            <a:ext cx="0" cy="500881"/>
+            <a:off x="6297915" y="1601030"/>
+            <a:ext cx="0" cy="431307"/>
           </a:xfrm>
           <a:prstGeom prst="straightConnector1">
             <a:avLst/>
@@ -4495,8 +4499,8 @@
         </p:nvCxnSpPr>
         <p:spPr>
           <a:xfrm>
-            <a:off x="6297915" y="1531456"/>
-            <a:ext cx="2508892" cy="500881"/>
+            <a:off x="6297915" y="1601030"/>
+            <a:ext cx="2508892" cy="431307"/>
           </a:xfrm>
           <a:prstGeom prst="straightConnector1">
             <a:avLst/>
@@ -4537,8 +4541,8 @@
         </p:nvCxnSpPr>
         <p:spPr>
           <a:xfrm>
-            <a:off x="6297915" y="2555557"/>
-            <a:ext cx="309" cy="873995"/>
+            <a:off x="6297915" y="2494002"/>
+            <a:ext cx="18341" cy="760734"/>
           </a:xfrm>
           <a:prstGeom prst="straightConnector1">
             <a:avLst/>
@@ -4580,8 +4584,8 @@
         </p:nvCxnSpPr>
         <p:spPr>
           <a:xfrm flipH="1">
-            <a:off x="6298224" y="2555557"/>
-            <a:ext cx="2508583" cy="873995"/>
+            <a:off x="6316256" y="2494002"/>
+            <a:ext cx="2490551" cy="760734"/>
           </a:xfrm>
           <a:prstGeom prst="straightConnector1">
             <a:avLst/>
@@ -4622,8 +4626,8 @@
         </p:nvCxnSpPr>
         <p:spPr>
           <a:xfrm>
-            <a:off x="3901092" y="2976042"/>
-            <a:ext cx="133943" cy="452958"/>
+            <a:off x="3901092" y="2668266"/>
+            <a:ext cx="133943" cy="760734"/>
           </a:xfrm>
           <a:prstGeom prst="straightConnector1">
             <a:avLst/>
@@ -4664,8 +4668,8 @@
         </p:nvCxnSpPr>
         <p:spPr>
           <a:xfrm>
-            <a:off x="4035035" y="3952220"/>
-            <a:ext cx="2262880" cy="536499"/>
+            <a:off x="4035035" y="3890665"/>
+            <a:ext cx="2262880" cy="347711"/>
           </a:xfrm>
           <a:prstGeom prst="straightConnector1">
             <a:avLst/>
@@ -4706,8 +4710,8 @@
         </p:nvCxnSpPr>
         <p:spPr>
           <a:xfrm flipH="1">
-            <a:off x="6297915" y="3952772"/>
-            <a:ext cx="309" cy="535947"/>
+            <a:off x="6297915" y="3531735"/>
+            <a:ext cx="18341" cy="706641"/>
           </a:xfrm>
           <a:prstGeom prst="straightConnector1">
             <a:avLst/>
@@ -4748,8 +4752,8 @@
         </p:nvCxnSpPr>
         <p:spPr>
           <a:xfrm flipH="1">
-            <a:off x="6297915" y="3952220"/>
-            <a:ext cx="2381575" cy="536499"/>
+            <a:off x="6297915" y="3890665"/>
+            <a:ext cx="2381575" cy="347711"/>
           </a:xfrm>
           <a:prstGeom prst="straightConnector1">
             <a:avLst/>
@@ -4791,8 +4795,8 @@
         </p:nvCxnSpPr>
         <p:spPr>
           <a:xfrm flipH="1">
-            <a:off x="8679490" y="2555557"/>
-            <a:ext cx="127317" cy="873443"/>
+            <a:off x="8679490" y="2494002"/>
+            <a:ext cx="127317" cy="934998"/>
           </a:xfrm>
           <a:prstGeom prst="straightConnector1">
             <a:avLst/>
@@ -4833,8 +4837,8 @@
         </p:nvCxnSpPr>
         <p:spPr>
           <a:xfrm flipH="1">
-            <a:off x="1835221" y="2498989"/>
-            <a:ext cx="981259" cy="1933137"/>
+            <a:off x="1823003" y="2345101"/>
+            <a:ext cx="993477" cy="1994904"/>
           </a:xfrm>
           <a:prstGeom prst="straightConnector1">
             <a:avLst/>
@@ -4875,8 +4879,8 @@
         </p:nvCxnSpPr>
         <p:spPr>
           <a:xfrm rot="5400000">
-            <a:off x="2924763" y="4176698"/>
-            <a:ext cx="1334751" cy="885795"/>
+            <a:off x="2811657" y="4199935"/>
+            <a:ext cx="1532649" cy="914109"/>
           </a:xfrm>
           <a:prstGeom prst="bentConnector2">
             <a:avLst/>
@@ -4916,9 +4920,9 @@
           <p:nvPr/>
         </p:nvCxnSpPr>
         <p:spPr>
-          <a:xfrm flipV="1">
-            <a:off x="2039211" y="5548581"/>
-            <a:ext cx="1" cy="269615"/>
+          <a:xfrm flipH="1" flipV="1">
+            <a:off x="2010898" y="5654146"/>
+            <a:ext cx="3174" cy="481924"/>
           </a:xfrm>
           <a:prstGeom prst="straightConnector1">
             <a:avLst/>
@@ -4959,8 +4963,8 @@
         </p:nvCxnSpPr>
         <p:spPr>
           <a:xfrm>
-            <a:off x="1835221" y="4739903"/>
-            <a:ext cx="203991" cy="285458"/>
+            <a:off x="1823003" y="4617004"/>
+            <a:ext cx="187895" cy="575477"/>
           </a:xfrm>
           <a:prstGeom prst="straightConnector1">
             <a:avLst/>
@@ -5001,12 +5005,12 @@
         </p:nvCxnSpPr>
         <p:spPr>
           <a:xfrm rot="10800000" flipH="1" flipV="1">
-            <a:off x="521202" y="4586014"/>
-            <a:ext cx="407980" cy="1493791"/>
+            <a:off x="508983" y="4478504"/>
+            <a:ext cx="395059" cy="1796065"/>
           </a:xfrm>
           <a:prstGeom prst="bentConnector3">
             <a:avLst>
-              <a:gd name="adj1" fmla="val -56032"/>
+              <a:gd name="adj1" fmla="val -57865"/>
             </a:avLst>
           </a:prstGeom>
           <a:ln>
@@ -5045,8 +5049,8 @@
         </p:nvCxnSpPr>
         <p:spPr>
           <a:xfrm>
-            <a:off x="7494595" y="4750329"/>
-            <a:ext cx="1184894" cy="1449651"/>
+            <a:off x="7494595" y="4469209"/>
+            <a:ext cx="1184894" cy="1996106"/>
           </a:xfrm>
           <a:prstGeom prst="straightConnector1">
             <a:avLst/>
@@ -5087,8 +5091,8 @@
         </p:nvCxnSpPr>
         <p:spPr>
           <a:xfrm>
-            <a:off x="7494595" y="4750329"/>
-            <a:ext cx="1184895" cy="75334"/>
+            <a:off x="7494595" y="4469209"/>
+            <a:ext cx="1184895" cy="341065"/>
           </a:xfrm>
           <a:prstGeom prst="straightConnector1">
             <a:avLst/>
@@ -5129,8 +5133,8 @@
         </p:nvCxnSpPr>
         <p:spPr>
           <a:xfrm flipH="1">
-            <a:off x="11307527" y="5464441"/>
-            <a:ext cx="1" cy="735539"/>
+            <a:off x="11307527" y="5559332"/>
+            <a:ext cx="1" cy="905983"/>
           </a:xfrm>
           <a:prstGeom prst="bentConnector3">
             <a:avLst>
@@ -5173,8 +5177,8 @@
         </p:nvCxnSpPr>
         <p:spPr>
           <a:xfrm>
-            <a:off x="9993509" y="4979551"/>
-            <a:ext cx="0" cy="223280"/>
+            <a:off x="9993509" y="4948773"/>
+            <a:ext cx="0" cy="379726"/>
           </a:xfrm>
           <a:prstGeom prst="straightConnector1">
             <a:avLst/>
@@ -5215,12 +5219,12 @@
         </p:nvCxnSpPr>
         <p:spPr>
           <a:xfrm>
-            <a:off x="4985703" y="2498989"/>
-            <a:ext cx="3693787" cy="2965452"/>
+            <a:off x="4985703" y="2345101"/>
+            <a:ext cx="3693787" cy="3214231"/>
           </a:xfrm>
           <a:prstGeom prst="bentConnector3">
             <a:avLst>
-              <a:gd name="adj1" fmla="val 1442"/>
+              <a:gd name="adj1" fmla="val 50000"/>
             </a:avLst>
           </a:prstGeom>
           <a:ln>
@@ -5256,7 +5260,7 @@
         </p:nvSpPr>
         <p:spPr>
           <a:xfrm>
-            <a:off x="2653607" y="208807"/>
+            <a:off x="2640851" y="608325"/>
             <a:ext cx="2332096" cy="307777"/>
           </a:xfrm>
           <a:prstGeom prst="rect">
@@ -5292,7 +5296,7 @@
         </p:nvSpPr>
         <p:spPr>
           <a:xfrm>
-            <a:off x="10145490" y="3639171"/>
+            <a:off x="10145490" y="3689665"/>
             <a:ext cx="1830531" cy="307777"/>
           </a:xfrm>
           <a:prstGeom prst="rect">
@@ -5347,6 +5351,865 @@
               <a:t>Track: ML Engineer</a:t>
             </a:r>
             <a:endParaRPr lang="ru-RU" sz="1400" dirty="0"/>
+          </a:p>
+        </p:txBody>
+      </p:sp>
+      <p:sp>
+        <p:nvSpPr>
+          <p:cNvPr id="5" name="Стрелка: вниз 4">
+            <a:extLst>
+              <a:ext uri="{FF2B5EF4-FFF2-40B4-BE49-F238E27FC236}">
+                <a16:creationId xmlns:a16="http://schemas.microsoft.com/office/drawing/2014/main" id="{6837848A-3E94-62AC-EB2A-0C6BAA3C72D6}"/>
+              </a:ext>
+            </a:extLst>
+          </p:cNvPr>
+          <p:cNvSpPr/>
+          <p:nvPr/>
+        </p:nvSpPr>
+        <p:spPr>
+          <a:xfrm>
+            <a:off x="6189329" y="653723"/>
+            <a:ext cx="217170" cy="287100"/>
+          </a:xfrm>
+          <a:prstGeom prst="downArrow">
+            <a:avLst/>
+          </a:prstGeom>
+        </p:spPr>
+        <p:style>
+          <a:lnRef idx="2">
+            <a:schemeClr val="accent1">
+              <a:shade val="50000"/>
+            </a:schemeClr>
+          </a:lnRef>
+          <a:fillRef idx="1">
+            <a:schemeClr val="accent1"/>
+          </a:fillRef>
+          <a:effectRef idx="0">
+            <a:schemeClr val="accent1"/>
+          </a:effectRef>
+          <a:fontRef idx="minor">
+            <a:schemeClr val="lt1"/>
+          </a:fontRef>
+        </p:style>
+        <p:txBody>
+          <a:bodyPr rtlCol="0" anchor="ctr"/>
+          <a:lstStyle/>
+          <a:p>
+            <a:pPr algn="ctr"/>
+            <a:endParaRPr lang="ru-RU"/>
+          </a:p>
+        </p:txBody>
+      </p:sp>
+      <p:sp>
+        <p:nvSpPr>
+          <p:cNvPr id="6" name="TextBox 5">
+            <a:extLst>
+              <a:ext uri="{FF2B5EF4-FFF2-40B4-BE49-F238E27FC236}">
+                <a16:creationId xmlns:a16="http://schemas.microsoft.com/office/drawing/2014/main" id="{CC247FE2-176F-3C96-1019-21BFDC8A6D19}"/>
+              </a:ext>
+            </a:extLst>
+          </p:cNvPr>
+          <p:cNvSpPr txBox="1"/>
+          <p:nvPr/>
+        </p:nvSpPr>
+        <p:spPr>
+          <a:xfrm>
+            <a:off x="4963784" y="244111"/>
+            <a:ext cx="2680019" cy="492443"/>
+          </a:xfrm>
+          <a:prstGeom prst="rect">
+            <a:avLst/>
+          </a:prstGeom>
+          <a:noFill/>
+        </p:spPr>
+        <p:txBody>
+          <a:bodyPr wrap="square" rtlCol="0">
+            <a:spAutoFit/>
+          </a:bodyPr>
+          <a:lstStyle/>
+          <a:p>
+            <a:pPr algn="ctr"/>
+            <a:r>
+              <a:rPr lang="en-US" sz="1300" dirty="0"/>
+              <a:t>Back-end </a:t>
+            </a:r>
+            <a:r>
+              <a:rPr lang="ru-RU" sz="1300" dirty="0"/>
+              <a:t>разработчик, выпускник «Программной Инженерии»</a:t>
+            </a:r>
+          </a:p>
+        </p:txBody>
+      </p:sp>
+      <p:sp>
+        <p:nvSpPr>
+          <p:cNvPr id="8" name="Стрелка: вниз 7">
+            <a:extLst>
+              <a:ext uri="{FF2B5EF4-FFF2-40B4-BE49-F238E27FC236}">
+                <a16:creationId xmlns:a16="http://schemas.microsoft.com/office/drawing/2014/main" id="{8EBED271-5B96-1C1B-7AC2-0BD4B57212BC}"/>
+              </a:ext>
+            </a:extLst>
+          </p:cNvPr>
+          <p:cNvSpPr/>
+          <p:nvPr/>
+        </p:nvSpPr>
+        <p:spPr>
+          <a:xfrm>
+            <a:off x="6201697" y="5025361"/>
+            <a:ext cx="217170" cy="740541"/>
+          </a:xfrm>
+          <a:prstGeom prst="downArrow">
+            <a:avLst/>
+          </a:prstGeom>
+        </p:spPr>
+        <p:style>
+          <a:lnRef idx="2">
+            <a:schemeClr val="accent1">
+              <a:shade val="50000"/>
+            </a:schemeClr>
+          </a:lnRef>
+          <a:fillRef idx="1">
+            <a:schemeClr val="accent1"/>
+          </a:fillRef>
+          <a:effectRef idx="0">
+            <a:schemeClr val="accent1"/>
+          </a:effectRef>
+          <a:fontRef idx="minor">
+            <a:schemeClr val="lt1"/>
+          </a:fontRef>
+        </p:style>
+        <p:txBody>
+          <a:bodyPr rtlCol="0" anchor="ctr"/>
+          <a:lstStyle/>
+          <a:p>
+            <a:pPr algn="ctr"/>
+            <a:endParaRPr lang="ru-RU"/>
+          </a:p>
+        </p:txBody>
+      </p:sp>
+      <p:sp>
+        <p:nvSpPr>
+          <p:cNvPr id="10" name="TextBox 9">
+            <a:extLst>
+              <a:ext uri="{FF2B5EF4-FFF2-40B4-BE49-F238E27FC236}">
+                <a16:creationId xmlns:a16="http://schemas.microsoft.com/office/drawing/2014/main" id="{C2D47E56-CCC8-0D5B-8B29-A500D7BF387A}"/>
+              </a:ext>
+            </a:extLst>
+          </p:cNvPr>
+          <p:cNvSpPr txBox="1"/>
+          <p:nvPr/>
+        </p:nvSpPr>
+        <p:spPr>
+          <a:xfrm>
+            <a:off x="4972947" y="5757232"/>
+            <a:ext cx="2680019" cy="492443"/>
+          </a:xfrm>
+          <a:prstGeom prst="rect">
+            <a:avLst/>
+          </a:prstGeom>
+          <a:noFill/>
+        </p:spPr>
+        <p:txBody>
+          <a:bodyPr wrap="square" rtlCol="0">
+            <a:spAutoFit/>
+          </a:bodyPr>
+          <a:lstStyle/>
+          <a:p>
+            <a:pPr algn="ctr"/>
+            <a:r>
+              <a:rPr lang="en-US" sz="1300" dirty="0"/>
+              <a:t>Database Developer, Data Engineer, DB optimization engineer</a:t>
+            </a:r>
+            <a:endParaRPr lang="ru-RU" sz="1300" dirty="0"/>
+          </a:p>
+        </p:txBody>
+      </p:sp>
+      <p:sp>
+        <p:nvSpPr>
+          <p:cNvPr id="12" name="TextBox 11">
+            <a:extLst>
+              <a:ext uri="{FF2B5EF4-FFF2-40B4-BE49-F238E27FC236}">
+                <a16:creationId xmlns:a16="http://schemas.microsoft.com/office/drawing/2014/main" id="{18E2ABF0-62D0-B80B-1BF8-F12B791BF6D4}"/>
+              </a:ext>
+            </a:extLst>
+          </p:cNvPr>
+          <p:cNvSpPr txBox="1"/>
+          <p:nvPr/>
+        </p:nvSpPr>
+        <p:spPr>
+          <a:xfrm>
+            <a:off x="4372391" y="1688283"/>
+            <a:ext cx="3851045" cy="215444"/>
+          </a:xfrm>
+          <a:prstGeom prst="rect">
+            <a:avLst/>
+          </a:prstGeom>
+          <a:ln/>
+        </p:spPr>
+        <p:style>
+          <a:lnRef idx="2">
+            <a:schemeClr val="accent3">
+              <a:shade val="50000"/>
+            </a:schemeClr>
+          </a:lnRef>
+          <a:fillRef idx="1">
+            <a:schemeClr val="accent3"/>
+          </a:fillRef>
+          <a:effectRef idx="0">
+            <a:schemeClr val="accent3"/>
+          </a:effectRef>
+          <a:fontRef idx="minor">
+            <a:schemeClr val="lt1"/>
+          </a:fontRef>
+        </p:style>
+        <p:txBody>
+          <a:bodyPr wrap="square">
+            <a:spAutoFit/>
+          </a:bodyPr>
+          <a:lstStyle/>
+          <a:p>
+            <a:pPr algn="ctr"/>
+            <a:r>
+              <a:rPr lang="ru-RU" sz="800" dirty="0"/>
+              <a:t>Знание основных проблем проектирования и разработки систем обработки БД</a:t>
+            </a:r>
+          </a:p>
+        </p:txBody>
+      </p:sp>
+      <p:sp>
+        <p:nvSpPr>
+          <p:cNvPr id="34" name="TextBox 33">
+            <a:extLst>
+              <a:ext uri="{FF2B5EF4-FFF2-40B4-BE49-F238E27FC236}">
+                <a16:creationId xmlns:a16="http://schemas.microsoft.com/office/drawing/2014/main" id="{C81A6380-4742-26EB-BC91-805EAEF54329}"/>
+              </a:ext>
+            </a:extLst>
+          </p:cNvPr>
+          <p:cNvSpPr txBox="1"/>
+          <p:nvPr/>
+        </p:nvSpPr>
+        <p:spPr>
+          <a:xfrm>
+            <a:off x="3064042" y="2763020"/>
+            <a:ext cx="1741216" cy="461665"/>
+          </a:xfrm>
+          <a:prstGeom prst="rect">
+            <a:avLst/>
+          </a:prstGeom>
+          <a:ln/>
+        </p:spPr>
+        <p:style>
+          <a:lnRef idx="2">
+            <a:schemeClr val="accent3">
+              <a:shade val="50000"/>
+            </a:schemeClr>
+          </a:lnRef>
+          <a:fillRef idx="1">
+            <a:schemeClr val="accent3"/>
+          </a:fillRef>
+          <a:effectRef idx="0">
+            <a:schemeClr val="accent3"/>
+          </a:effectRef>
+          <a:fontRef idx="minor">
+            <a:schemeClr val="lt1"/>
+          </a:fontRef>
+        </p:style>
+        <p:txBody>
+          <a:bodyPr wrap="square">
+            <a:spAutoFit/>
+          </a:bodyPr>
+          <a:lstStyle/>
+          <a:p>
+            <a:pPr algn="ctr"/>
+            <a:r>
+              <a:rPr lang="ru-RU" sz="800" dirty="0"/>
+              <a:t>Инструменты разработки параллельной и распределенной работы с данными</a:t>
+            </a:r>
+          </a:p>
+        </p:txBody>
+      </p:sp>
+      <p:sp>
+        <p:nvSpPr>
+          <p:cNvPr id="36" name="TextBox 35">
+            <a:extLst>
+              <a:ext uri="{FF2B5EF4-FFF2-40B4-BE49-F238E27FC236}">
+                <a16:creationId xmlns:a16="http://schemas.microsoft.com/office/drawing/2014/main" id="{A6D263CF-74E5-F23D-C4C6-94F6695E8977}"/>
+              </a:ext>
+            </a:extLst>
+          </p:cNvPr>
+          <p:cNvSpPr txBox="1"/>
+          <p:nvPr/>
+        </p:nvSpPr>
+        <p:spPr>
+          <a:xfrm>
+            <a:off x="3175422" y="3956800"/>
+            <a:ext cx="1741216" cy="584775"/>
+          </a:xfrm>
+          <a:prstGeom prst="rect">
+            <a:avLst/>
+          </a:prstGeom>
+          <a:ln/>
+        </p:spPr>
+        <p:style>
+          <a:lnRef idx="2">
+            <a:schemeClr val="accent3">
+              <a:shade val="50000"/>
+            </a:schemeClr>
+          </a:lnRef>
+          <a:fillRef idx="1">
+            <a:schemeClr val="accent3"/>
+          </a:fillRef>
+          <a:effectRef idx="0">
+            <a:schemeClr val="accent3"/>
+          </a:effectRef>
+          <a:fontRef idx="minor">
+            <a:schemeClr val="lt1"/>
+          </a:fontRef>
+        </p:style>
+        <p:txBody>
+          <a:bodyPr wrap="square">
+            <a:spAutoFit/>
+          </a:bodyPr>
+          <a:lstStyle/>
+          <a:p>
+            <a:pPr algn="ctr"/>
+            <a:r>
+              <a:rPr lang="ru-RU" sz="800" dirty="0"/>
+              <a:t>Алгоритмы и инструменты </a:t>
+            </a:r>
+            <a:r>
+              <a:rPr lang="ru-RU" sz="800" dirty="0" err="1"/>
+              <a:t>оркестрации</a:t>
+            </a:r>
+            <a:r>
+              <a:rPr lang="ru-RU" sz="800" dirty="0"/>
+              <a:t> и синхронизации вычислений в </a:t>
+            </a:r>
+            <a:r>
+              <a:rPr lang="ru-RU" sz="800" dirty="0" err="1"/>
+              <a:t>многоагентных</a:t>
+            </a:r>
+            <a:r>
+              <a:rPr lang="ru-RU" sz="800" dirty="0"/>
+              <a:t> кластерах</a:t>
+            </a:r>
+          </a:p>
+        </p:txBody>
+      </p:sp>
+      <p:sp>
+        <p:nvSpPr>
+          <p:cNvPr id="44" name="TextBox 43">
+            <a:extLst>
+              <a:ext uri="{FF2B5EF4-FFF2-40B4-BE49-F238E27FC236}">
+                <a16:creationId xmlns:a16="http://schemas.microsoft.com/office/drawing/2014/main" id="{2C875087-C85E-3918-9517-F7904CD0F654}"/>
+              </a:ext>
+            </a:extLst>
+          </p:cNvPr>
+          <p:cNvSpPr txBox="1"/>
+          <p:nvPr/>
+        </p:nvSpPr>
+        <p:spPr>
+          <a:xfrm>
+            <a:off x="5445647" y="2575933"/>
+            <a:ext cx="1741216" cy="461665"/>
+          </a:xfrm>
+          <a:prstGeom prst="rect">
+            <a:avLst/>
+          </a:prstGeom>
+          <a:ln/>
+        </p:spPr>
+        <p:style>
+          <a:lnRef idx="2">
+            <a:schemeClr val="accent3">
+              <a:shade val="50000"/>
+            </a:schemeClr>
+          </a:lnRef>
+          <a:fillRef idx="1">
+            <a:schemeClr val="accent3"/>
+          </a:fillRef>
+          <a:effectRef idx="0">
+            <a:schemeClr val="accent3"/>
+          </a:effectRef>
+          <a:fontRef idx="minor">
+            <a:schemeClr val="lt1"/>
+          </a:fontRef>
+        </p:style>
+        <p:txBody>
+          <a:bodyPr wrap="square">
+            <a:spAutoFit/>
+          </a:bodyPr>
+          <a:lstStyle/>
+          <a:p>
+            <a:pPr algn="ctr"/>
+            <a:r>
+              <a:rPr lang="ru-RU" sz="800" dirty="0"/>
+              <a:t>Инструменты и алгоритмы оптимизации доступа к системам хранения больших данных</a:t>
+            </a:r>
+          </a:p>
+        </p:txBody>
+      </p:sp>
+      <p:sp>
+        <p:nvSpPr>
+          <p:cNvPr id="46" name="TextBox 45">
+            <a:extLst>
+              <a:ext uri="{FF2B5EF4-FFF2-40B4-BE49-F238E27FC236}">
+                <a16:creationId xmlns:a16="http://schemas.microsoft.com/office/drawing/2014/main" id="{CBEC78CD-830E-B37F-A8C5-A4F1AD849CDF}"/>
+              </a:ext>
+            </a:extLst>
+          </p:cNvPr>
+          <p:cNvSpPr txBox="1"/>
+          <p:nvPr/>
+        </p:nvSpPr>
+        <p:spPr>
+          <a:xfrm>
+            <a:off x="7769147" y="2601143"/>
+            <a:ext cx="1741216" cy="338554"/>
+          </a:xfrm>
+          <a:prstGeom prst="rect">
+            <a:avLst/>
+          </a:prstGeom>
+          <a:ln/>
+        </p:spPr>
+        <p:style>
+          <a:lnRef idx="2">
+            <a:schemeClr val="accent3">
+              <a:shade val="50000"/>
+            </a:schemeClr>
+          </a:lnRef>
+          <a:fillRef idx="1">
+            <a:schemeClr val="accent3"/>
+          </a:fillRef>
+          <a:effectRef idx="0">
+            <a:schemeClr val="accent3"/>
+          </a:effectRef>
+          <a:fontRef idx="minor">
+            <a:schemeClr val="lt1"/>
+          </a:fontRef>
+        </p:style>
+        <p:txBody>
+          <a:bodyPr wrap="square">
+            <a:spAutoFit/>
+          </a:bodyPr>
+          <a:lstStyle/>
+          <a:p>
+            <a:pPr algn="ctr"/>
+            <a:r>
+              <a:rPr lang="ru-RU" sz="800" dirty="0"/>
+              <a:t>Алгоритмы сжатия без потерь, используемые в базах данных</a:t>
+            </a:r>
+          </a:p>
+        </p:txBody>
+      </p:sp>
+      <p:sp>
+        <p:nvSpPr>
+          <p:cNvPr id="48" name="TextBox 47">
+            <a:extLst>
+              <a:ext uri="{FF2B5EF4-FFF2-40B4-BE49-F238E27FC236}">
+                <a16:creationId xmlns:a16="http://schemas.microsoft.com/office/drawing/2014/main" id="{F4A72456-06B0-152D-18D9-1A3795E2CAA0}"/>
+              </a:ext>
+            </a:extLst>
+          </p:cNvPr>
+          <p:cNvSpPr txBox="1"/>
+          <p:nvPr/>
+        </p:nvSpPr>
+        <p:spPr>
+          <a:xfrm>
+            <a:off x="7805604" y="3944668"/>
+            <a:ext cx="1741216" cy="584775"/>
+          </a:xfrm>
+          <a:prstGeom prst="rect">
+            <a:avLst/>
+          </a:prstGeom>
+          <a:ln/>
+        </p:spPr>
+        <p:style>
+          <a:lnRef idx="2">
+            <a:schemeClr val="accent3">
+              <a:shade val="50000"/>
+            </a:schemeClr>
+          </a:lnRef>
+          <a:fillRef idx="1">
+            <a:schemeClr val="accent3"/>
+          </a:fillRef>
+          <a:effectRef idx="0">
+            <a:schemeClr val="accent3"/>
+          </a:effectRef>
+          <a:fontRef idx="minor">
+            <a:schemeClr val="lt1"/>
+          </a:fontRef>
+        </p:style>
+        <p:txBody>
+          <a:bodyPr wrap="square">
+            <a:spAutoFit/>
+          </a:bodyPr>
+          <a:lstStyle/>
+          <a:p>
+            <a:pPr algn="ctr"/>
+            <a:r>
+              <a:rPr lang="ru-RU" sz="800" dirty="0"/>
+              <a:t>Алгоритмы и инструменты аппаратного и программного обеспечения надежности хранения данных</a:t>
+            </a:r>
+          </a:p>
+        </p:txBody>
+      </p:sp>
+      <p:sp>
+        <p:nvSpPr>
+          <p:cNvPr id="50" name="TextBox 49">
+            <a:extLst>
+              <a:ext uri="{FF2B5EF4-FFF2-40B4-BE49-F238E27FC236}">
+                <a16:creationId xmlns:a16="http://schemas.microsoft.com/office/drawing/2014/main" id="{D2F6E90C-1D5F-9789-2B4F-E5CDE9D161E8}"/>
+              </a:ext>
+            </a:extLst>
+          </p:cNvPr>
+          <p:cNvSpPr txBox="1"/>
+          <p:nvPr/>
+        </p:nvSpPr>
+        <p:spPr>
+          <a:xfrm>
+            <a:off x="5438301" y="3582266"/>
+            <a:ext cx="1741216" cy="338554"/>
+          </a:xfrm>
+          <a:prstGeom prst="rect">
+            <a:avLst/>
+          </a:prstGeom>
+          <a:ln/>
+        </p:spPr>
+        <p:style>
+          <a:lnRef idx="2">
+            <a:schemeClr val="accent3">
+              <a:shade val="50000"/>
+            </a:schemeClr>
+          </a:lnRef>
+          <a:fillRef idx="1">
+            <a:schemeClr val="accent3"/>
+          </a:fillRef>
+          <a:effectRef idx="0">
+            <a:schemeClr val="accent3"/>
+          </a:effectRef>
+          <a:fontRef idx="minor">
+            <a:schemeClr val="lt1"/>
+          </a:fontRef>
+        </p:style>
+        <p:txBody>
+          <a:bodyPr wrap="square">
+            <a:spAutoFit/>
+          </a:bodyPr>
+          <a:lstStyle/>
+          <a:p>
+            <a:pPr algn="ctr"/>
+            <a:r>
+              <a:rPr lang="ru-RU" sz="800" dirty="0"/>
+              <a:t>Архитектура, достоинства и недостатки </a:t>
+            </a:r>
+            <a:r>
+              <a:rPr lang="ru-RU" sz="800" dirty="0" err="1"/>
+              <a:t>соврменных</a:t>
+            </a:r>
+            <a:r>
+              <a:rPr lang="ru-RU" sz="800" dirty="0"/>
+              <a:t> </a:t>
+            </a:r>
+            <a:r>
+              <a:rPr lang="en-US" sz="800" dirty="0"/>
+              <a:t>NoSQL </a:t>
+            </a:r>
+            <a:r>
+              <a:rPr lang="ru-RU" sz="800" dirty="0"/>
+              <a:t>БД</a:t>
+            </a:r>
+          </a:p>
+        </p:txBody>
+      </p:sp>
+      <p:sp>
+        <p:nvSpPr>
+          <p:cNvPr id="52" name="TextBox 51">
+            <a:extLst>
+              <a:ext uri="{FF2B5EF4-FFF2-40B4-BE49-F238E27FC236}">
+                <a16:creationId xmlns:a16="http://schemas.microsoft.com/office/drawing/2014/main" id="{8D900B94-81E2-FA6C-63DB-C914B19A15B7}"/>
+              </a:ext>
+            </a:extLst>
+          </p:cNvPr>
+          <p:cNvSpPr txBox="1"/>
+          <p:nvPr/>
+        </p:nvSpPr>
+        <p:spPr>
+          <a:xfrm>
+            <a:off x="5466901" y="4713469"/>
+            <a:ext cx="1741216" cy="338554"/>
+          </a:xfrm>
+          <a:prstGeom prst="rect">
+            <a:avLst/>
+          </a:prstGeom>
+          <a:ln/>
+        </p:spPr>
+        <p:style>
+          <a:lnRef idx="2">
+            <a:schemeClr val="accent3">
+              <a:shade val="50000"/>
+            </a:schemeClr>
+          </a:lnRef>
+          <a:fillRef idx="1">
+            <a:schemeClr val="accent3"/>
+          </a:fillRef>
+          <a:effectRef idx="0">
+            <a:schemeClr val="accent3"/>
+          </a:effectRef>
+          <a:fontRef idx="minor">
+            <a:schemeClr val="lt1"/>
+          </a:fontRef>
+        </p:style>
+        <p:txBody>
+          <a:bodyPr wrap="square">
+            <a:spAutoFit/>
+          </a:bodyPr>
+          <a:lstStyle/>
+          <a:p>
+            <a:pPr algn="ctr"/>
+            <a:r>
+              <a:rPr lang="ru-RU" sz="800" dirty="0"/>
+              <a:t>Паттерны проектирования систем обработки больших </a:t>
+            </a:r>
+            <a:r>
+              <a:rPr lang="ru-RU" sz="800" dirty="0" err="1"/>
+              <a:t>даных</a:t>
+            </a:r>
+            <a:endParaRPr lang="ru-RU" sz="800" dirty="0"/>
+          </a:p>
+        </p:txBody>
+      </p:sp>
+      <p:sp>
+        <p:nvSpPr>
+          <p:cNvPr id="69" name="TextBox 68">
+            <a:extLst>
+              <a:ext uri="{FF2B5EF4-FFF2-40B4-BE49-F238E27FC236}">
+                <a16:creationId xmlns:a16="http://schemas.microsoft.com/office/drawing/2014/main" id="{C51CF0BC-756A-5DB2-86B3-341A35DA6ED3}"/>
+              </a:ext>
+            </a:extLst>
+          </p:cNvPr>
+          <p:cNvSpPr txBox="1"/>
+          <p:nvPr/>
+        </p:nvSpPr>
+        <p:spPr>
+          <a:xfrm>
+            <a:off x="376918" y="4711458"/>
+            <a:ext cx="2971707" cy="338554"/>
+          </a:xfrm>
+          <a:prstGeom prst="rect">
+            <a:avLst/>
+          </a:prstGeom>
+          <a:ln/>
+        </p:spPr>
+        <p:style>
+          <a:lnRef idx="2">
+            <a:schemeClr val="accent3">
+              <a:shade val="50000"/>
+            </a:schemeClr>
+          </a:lnRef>
+          <a:fillRef idx="1">
+            <a:schemeClr val="accent3"/>
+          </a:fillRef>
+          <a:effectRef idx="0">
+            <a:schemeClr val="accent3"/>
+          </a:effectRef>
+          <a:fontRef idx="minor">
+            <a:schemeClr val="lt1"/>
+          </a:fontRef>
+        </p:style>
+        <p:txBody>
+          <a:bodyPr wrap="square">
+            <a:spAutoFit/>
+          </a:bodyPr>
+          <a:lstStyle/>
+          <a:p>
+            <a:pPr algn="ctr"/>
+            <a:r>
+              <a:rPr lang="ru-RU" sz="800" dirty="0"/>
+              <a:t>Инструменты оптимизации вычислений с использованием специализированных аппаратных средств</a:t>
+            </a:r>
+          </a:p>
+        </p:txBody>
+      </p:sp>
+      <p:sp>
+        <p:nvSpPr>
+          <p:cNvPr id="79" name="TextBox 78">
+            <a:extLst>
+              <a:ext uri="{FF2B5EF4-FFF2-40B4-BE49-F238E27FC236}">
+                <a16:creationId xmlns:a16="http://schemas.microsoft.com/office/drawing/2014/main" id="{766054DC-3D07-3F74-D5EC-1318276F0032}"/>
+              </a:ext>
+            </a:extLst>
+          </p:cNvPr>
+          <p:cNvSpPr txBox="1"/>
+          <p:nvPr/>
+        </p:nvSpPr>
+        <p:spPr>
+          <a:xfrm>
+            <a:off x="337149" y="5859802"/>
+            <a:ext cx="2971707" cy="215444"/>
+          </a:xfrm>
+          <a:prstGeom prst="rect">
+            <a:avLst/>
+          </a:prstGeom>
+          <a:ln/>
+        </p:spPr>
+        <p:style>
+          <a:lnRef idx="2">
+            <a:schemeClr val="accent3">
+              <a:shade val="50000"/>
+            </a:schemeClr>
+          </a:lnRef>
+          <a:fillRef idx="1">
+            <a:schemeClr val="accent3"/>
+          </a:fillRef>
+          <a:effectRef idx="0">
+            <a:schemeClr val="accent3"/>
+          </a:effectRef>
+          <a:fontRef idx="minor">
+            <a:schemeClr val="lt1"/>
+          </a:fontRef>
+        </p:style>
+        <p:txBody>
+          <a:bodyPr wrap="square">
+            <a:spAutoFit/>
+          </a:bodyPr>
+          <a:lstStyle/>
+          <a:p>
+            <a:pPr algn="ctr"/>
+            <a:r>
+              <a:rPr lang="ru-RU" sz="800" dirty="0"/>
+              <a:t>Проблематика </a:t>
+            </a:r>
+            <a:r>
+              <a:rPr lang="en-US" sz="800" dirty="0"/>
+              <a:t>ML </a:t>
+            </a:r>
+            <a:r>
+              <a:rPr lang="ru-RU" sz="800" dirty="0"/>
+              <a:t>и базовые алгоритмы решения задач </a:t>
+            </a:r>
+            <a:r>
+              <a:rPr lang="en-US" sz="800" dirty="0"/>
+              <a:t>ML</a:t>
+            </a:r>
+            <a:endParaRPr lang="ru-RU" sz="800" dirty="0"/>
+          </a:p>
+        </p:txBody>
+      </p:sp>
+      <p:sp>
+        <p:nvSpPr>
+          <p:cNvPr id="88" name="TextBox 87">
+            <a:extLst>
+              <a:ext uri="{FF2B5EF4-FFF2-40B4-BE49-F238E27FC236}">
+                <a16:creationId xmlns:a16="http://schemas.microsoft.com/office/drawing/2014/main" id="{AEB8FC22-89E3-9B3A-0F29-2359B39BF20B}"/>
+              </a:ext>
+            </a:extLst>
+          </p:cNvPr>
+          <p:cNvSpPr txBox="1"/>
+          <p:nvPr/>
+        </p:nvSpPr>
+        <p:spPr>
+          <a:xfrm>
+            <a:off x="8577984" y="5009241"/>
+            <a:ext cx="2971707" cy="215444"/>
+          </a:xfrm>
+          <a:prstGeom prst="rect">
+            <a:avLst/>
+          </a:prstGeom>
+          <a:ln/>
+        </p:spPr>
+        <p:style>
+          <a:lnRef idx="2">
+            <a:schemeClr val="accent3">
+              <a:shade val="50000"/>
+            </a:schemeClr>
+          </a:lnRef>
+          <a:fillRef idx="1">
+            <a:schemeClr val="accent3"/>
+          </a:fillRef>
+          <a:effectRef idx="0">
+            <a:schemeClr val="accent3"/>
+          </a:effectRef>
+          <a:fontRef idx="minor">
+            <a:schemeClr val="lt1"/>
+          </a:fontRef>
+        </p:style>
+        <p:txBody>
+          <a:bodyPr wrap="square">
+            <a:spAutoFit/>
+          </a:bodyPr>
+          <a:lstStyle/>
+          <a:p>
+            <a:pPr algn="ctr"/>
+            <a:r>
+              <a:rPr lang="ru-RU" sz="800" dirty="0"/>
+              <a:t>Аналитические базы данных и основные паттерны</a:t>
+            </a:r>
+          </a:p>
+        </p:txBody>
+      </p:sp>
+      <p:sp>
+        <p:nvSpPr>
+          <p:cNvPr id="89" name="TextBox 88">
+            <a:extLst>
+              <a:ext uri="{FF2B5EF4-FFF2-40B4-BE49-F238E27FC236}">
+                <a16:creationId xmlns:a16="http://schemas.microsoft.com/office/drawing/2014/main" id="{8FA62871-0556-A2A0-AFF1-64B59873453E}"/>
+              </a:ext>
+            </a:extLst>
+          </p:cNvPr>
+          <p:cNvSpPr txBox="1"/>
+          <p:nvPr/>
+        </p:nvSpPr>
+        <p:spPr>
+          <a:xfrm>
+            <a:off x="8726677" y="5837599"/>
+            <a:ext cx="3348350" cy="338554"/>
+          </a:xfrm>
+          <a:prstGeom prst="rect">
+            <a:avLst/>
+          </a:prstGeom>
+          <a:ln/>
+        </p:spPr>
+        <p:style>
+          <a:lnRef idx="2">
+            <a:schemeClr val="accent3">
+              <a:shade val="50000"/>
+            </a:schemeClr>
+          </a:lnRef>
+          <a:fillRef idx="1">
+            <a:schemeClr val="accent3"/>
+          </a:fillRef>
+          <a:effectRef idx="0">
+            <a:schemeClr val="accent3"/>
+          </a:effectRef>
+          <a:fontRef idx="minor">
+            <a:schemeClr val="lt1"/>
+          </a:fontRef>
+        </p:style>
+        <p:txBody>
+          <a:bodyPr wrap="square">
+            <a:spAutoFit/>
+          </a:bodyPr>
+          <a:lstStyle/>
+          <a:p>
+            <a:pPr algn="ctr"/>
+            <a:r>
+              <a:rPr lang="ru-RU" sz="800" dirty="0"/>
+              <a:t>Оптимизация </a:t>
+            </a:r>
+            <a:r>
+              <a:rPr lang="en-US" sz="800" dirty="0"/>
+              <a:t>Java-</a:t>
+            </a:r>
+            <a:r>
+              <a:rPr lang="ru-RU" sz="800" dirty="0"/>
+              <a:t>программ, конкурентное программирование, </a:t>
+            </a:r>
+            <a:r>
+              <a:rPr lang="ru-RU" sz="800" dirty="0" err="1"/>
+              <a:t>асинхрованная</a:t>
+            </a:r>
+            <a:r>
+              <a:rPr lang="ru-RU" sz="800" dirty="0"/>
+              <a:t> обработка данных</a:t>
+            </a:r>
           </a:p>
         </p:txBody>
       </p:sp>

</xml_diff>